<commit_message>
Added JupyterLab intro notebook & new presentations.
</commit_message>
<xml_diff>
--- a/presentations/model_training_overview.pptx
+++ b/presentations/model_training_overview.pptx
@@ -5,16 +5,14 @@
     <p:sldMasterId id="2147483648" r:id="rId1"/>
   </p:sldMasterIdLst>
   <p:notesMasterIdLst>
-    <p:notesMasterId r:id="rId9"/>
+    <p:notesMasterId r:id="rId7"/>
   </p:notesMasterIdLst>
   <p:sldIdLst>
     <p:sldId id="322" r:id="rId2"/>
     <p:sldId id="258" r:id="rId3"/>
     <p:sldId id="323" r:id="rId4"/>
-    <p:sldId id="267" r:id="rId5"/>
-    <p:sldId id="269" r:id="rId6"/>
-    <p:sldId id="324" r:id="rId7"/>
-    <p:sldId id="325" r:id="rId8"/>
+    <p:sldId id="325" r:id="rId5"/>
+    <p:sldId id="267" r:id="rId6"/>
   </p:sldIdLst>
   <p:sldSz cx="12192000" cy="6858000"/>
   <p:notesSz cx="7023100" cy="9309100"/>
@@ -214,7 +212,7 @@
           <a:p>
             <a:fld id="{FD93C9B2-20F6-4DB1-B471-224337D0AC79}" type="datetimeFigureOut">
               <a:rPr lang="en-US" smtClean="0"/>
-              <a:t>6/14/2022</a:t>
+              <a:t>9/1/2022</a:t>
             </a:fld>
             <a:endParaRPr lang="en-US"/>
           </a:p>
@@ -790,51 +788,6 @@
           <a:bodyPr/>
           <a:lstStyle/>
           <a:p>
-            <a:r>
-              <a:rPr lang="en-US" dirty="0"/>
-              <a:t>Neural networks are always built to solve a specific type of problem, although this doesn’t mean they can’t be used as “general purpose” tools.  Examples of specific uses include: prediction, forecasting, estimation, classification, and pattern recognition.</a:t>
-            </a:r>
-          </a:p>
-          <a:p>
-            <a:endParaRPr lang="en-US" dirty="0"/>
-          </a:p>
-          <a:p>
-            <a:r>
-              <a:rPr lang="en-US" dirty="0"/>
-              <a:t>A neural network has three basic sections, or parts, and each part is composed of “nodes”.  There’s the input layer, one or more hidden layers (sometimes dozens of hidden layers), and a final output layer.</a:t>
-            </a:r>
-          </a:p>
-          <a:p>
-            <a:endParaRPr lang="en-US" dirty="0"/>
-          </a:p>
-          <a:p>
-            <a:r>
-              <a:rPr lang="en-US" dirty="0"/>
-              <a:t>Neural networks are built two ways.  With a feedforward neural network, signals travel only one way, from input to output.  These types of networks are straightforward and used extensively in pattern recognition.  A convolutional neural network (CNN) is a specific type of feedforward network often used in image recognition.  With feedback – or recurrent neural networks – signals can travel both directions and there can be loops.  RNN are more powerful and complex than CNN’s. Despite this, RNN’s have been less influential than feedforward networks.</a:t>
-            </a:r>
-          </a:p>
-          <a:p>
-            <a:endParaRPr lang="en-US" dirty="0"/>
-          </a:p>
-          <a:p>
-            <a:r>
-              <a:rPr lang="en-US" dirty="0"/>
-              <a:t>Neural networks are either fixed or adaptive.  The weight values in a fixed network remain static.  They do not change.  On the other hand, weight values in an adaptive network can change.</a:t>
-            </a:r>
-          </a:p>
-          <a:p>
-            <a:endParaRPr lang="en-US" dirty="0"/>
-          </a:p>
-          <a:p>
-            <a:r>
-              <a:rPr lang="en-US" dirty="0"/>
-              <a:t>Neural networks use three types of datasets.  The training dataset is used to adjust the weights of the neural network.  The validation dataset is used to minimize a problem known as overfitting, which we cover late.  The testing dataset is used as a final test to gauge how accurately the network has been trained.  All three datasets are usually taken from the project’s primary dataset, sliced into three parts.  Typically, the data is split as follows:  Training data: 60%  -- Validation data: 20% -- Testing data: 20%. </a:t>
-            </a:r>
-          </a:p>
-          <a:p>
-            <a:endParaRPr lang="en-US" dirty="0"/>
-          </a:p>
-          <a:p>
             <a:endParaRPr lang="en-US" dirty="0"/>
           </a:p>
         </p:txBody>
@@ -865,7 +818,7 @@
     </p:spTree>
     <p:extLst>
       <p:ext uri="{BB962C8B-B14F-4D97-AF65-F5344CB8AC3E}">
-        <p14:creationId xmlns:p14="http://schemas.microsoft.com/office/powerpoint/2010/main" val="1135150984"/>
+        <p14:creationId xmlns:p14="http://schemas.microsoft.com/office/powerpoint/2010/main" val="530243603"/>
       </p:ext>
     </p:extLst>
   </p:cSld>
@@ -921,8 +874,50 @@
           <a:p>
             <a:r>
               <a:rPr lang="en-US" dirty="0"/>
-              <a:t>And finally – as you continue your deep learning journey – you will encounter a variety of mathematical equations and symbols.  But do not fear!  With a little effort, you will quickly master them.  To get you started, here’s a list of the most frequently used mathematical symbols in deep learning, along with their definitions.  </a:t>
-            </a:r>
+              <a:t>Neural networks are always built to solve a specific type of problem, although this doesn’t mean they can’t be used as “general purpose” tools.  Examples of specific uses include: prediction, forecasting, estimation, classification, and pattern recognition.</a:t>
+            </a:r>
+          </a:p>
+          <a:p>
+            <a:endParaRPr lang="en-US" dirty="0"/>
+          </a:p>
+          <a:p>
+            <a:r>
+              <a:rPr lang="en-US" dirty="0"/>
+              <a:t>A neural network has three basic sections, or parts, and each part is composed of “nodes”.  There’s the input layer, one or more hidden layers (sometimes dozens of hidden layers), and a final output layer.</a:t>
+            </a:r>
+          </a:p>
+          <a:p>
+            <a:endParaRPr lang="en-US" dirty="0"/>
+          </a:p>
+          <a:p>
+            <a:r>
+              <a:rPr lang="en-US" dirty="0"/>
+              <a:t>Neural networks are built two ways.  With a feedforward neural network, signals travel only one way, from input to output.  These types of networks are straightforward and used extensively in pattern recognition.  A convolutional neural network (CNN) is a specific type of feedforward network often used in image recognition.  With feedback – or recurrent neural networks – signals can travel both directions and there can be loops.  RNN are more powerful and complex than CNN’s. Despite this, RNN’s have been less influential than feedforward networks.</a:t>
+            </a:r>
+          </a:p>
+          <a:p>
+            <a:endParaRPr lang="en-US" dirty="0"/>
+          </a:p>
+          <a:p>
+            <a:r>
+              <a:rPr lang="en-US" dirty="0"/>
+              <a:t>Neural networks are either fixed or adaptive.  The weight values in a fixed network remain static.  They do not change.  On the other hand, weight values in an adaptive network can change.</a:t>
+            </a:r>
+          </a:p>
+          <a:p>
+            <a:endParaRPr lang="en-US" dirty="0"/>
+          </a:p>
+          <a:p>
+            <a:r>
+              <a:rPr lang="en-US" dirty="0"/>
+              <a:t>Neural networks use three types of datasets.  The training dataset is used to adjust the weights of the neural network.  The validation dataset is used to minimize a problem known as overfitting, which we cover late.  The testing dataset is used as a final test to gauge how accurately the network has been trained.  All three datasets are usually taken from the project’s primary dataset, sliced into three parts.  Typically, the data is split as follows:  Training data: 60%  -- Validation data: 20% -- Testing data: 20%. </a:t>
+            </a:r>
+          </a:p>
+          <a:p>
+            <a:endParaRPr lang="en-US" dirty="0"/>
+          </a:p>
+          <a:p>
+            <a:endParaRPr lang="en-US" dirty="0"/>
           </a:p>
         </p:txBody>
       </p:sp>
@@ -952,175 +947,7 @@
     </p:spTree>
     <p:extLst>
       <p:ext uri="{BB962C8B-B14F-4D97-AF65-F5344CB8AC3E}">
-        <p14:creationId xmlns:p14="http://schemas.microsoft.com/office/powerpoint/2010/main" val="2550897438"/>
-      </p:ext>
-    </p:extLst>
-  </p:cSld>
-  <p:clrMapOvr>
-    <a:masterClrMapping/>
-  </p:clrMapOvr>
-</p:notes>
-</file>
-
-<file path=ppt/notesSlides/notesSlide6.xml><?xml version="1.0" encoding="utf-8"?>
-<p:notes xmlns:a="http://schemas.openxmlformats.org/drawingml/2006/main" xmlns:r="http://schemas.openxmlformats.org/officeDocument/2006/relationships" xmlns:p="http://schemas.openxmlformats.org/presentationml/2006/main">
-  <p:cSld>
-    <p:spTree>
-      <p:nvGrpSpPr>
-        <p:cNvPr id="1" name=""/>
-        <p:cNvGrpSpPr/>
-        <p:nvPr/>
-      </p:nvGrpSpPr>
-      <p:grpSpPr>
-        <a:xfrm>
-          <a:off x="0" y="0"/>
-          <a:ext cx="0" cy="0"/>
-          <a:chOff x="0" y="0"/>
-          <a:chExt cx="0" cy="0"/>
-        </a:xfrm>
-      </p:grpSpPr>
-      <p:sp>
-        <p:nvSpPr>
-          <p:cNvPr id="2" name="Slide Image Placeholder 1"/>
-          <p:cNvSpPr>
-            <a:spLocks noGrp="1" noRot="1" noChangeAspect="1"/>
-          </p:cNvSpPr>
-          <p:nvPr>
-            <p:ph type="sldImg"/>
-          </p:nvPr>
-        </p:nvSpPr>
-        <p:spPr/>
-      </p:sp>
-      <p:sp>
-        <p:nvSpPr>
-          <p:cNvPr id="3" name="Notes Placeholder 2"/>
-          <p:cNvSpPr>
-            <a:spLocks noGrp="1"/>
-          </p:cNvSpPr>
-          <p:nvPr>
-            <p:ph type="body" idx="1"/>
-          </p:nvPr>
-        </p:nvSpPr>
-        <p:spPr/>
-        <p:txBody>
-          <a:bodyPr/>
-          <a:lstStyle/>
-          <a:p>
-            <a:endParaRPr lang="en-US" dirty="0"/>
-          </a:p>
-        </p:txBody>
-      </p:sp>
-      <p:sp>
-        <p:nvSpPr>
-          <p:cNvPr id="4" name="Slide Number Placeholder 3"/>
-          <p:cNvSpPr>
-            <a:spLocks noGrp="1"/>
-          </p:cNvSpPr>
-          <p:nvPr>
-            <p:ph type="sldNum" sz="quarter" idx="5"/>
-          </p:nvPr>
-        </p:nvSpPr>
-        <p:spPr/>
-        <p:txBody>
-          <a:bodyPr/>
-          <a:lstStyle/>
-          <a:p>
-            <a:fld id="{3148858F-F1DB-4027-9C85-CCA6849540DD}" type="slidenum">
-              <a:rPr lang="en-US" smtClean="0"/>
-              <a:t>6</a:t>
-            </a:fld>
-            <a:endParaRPr lang="en-US"/>
-          </a:p>
-        </p:txBody>
-      </p:sp>
-    </p:spTree>
-    <p:extLst>
-      <p:ext uri="{BB962C8B-B14F-4D97-AF65-F5344CB8AC3E}">
-        <p14:creationId xmlns:p14="http://schemas.microsoft.com/office/powerpoint/2010/main" val="1193799995"/>
-      </p:ext>
-    </p:extLst>
-  </p:cSld>
-  <p:clrMapOvr>
-    <a:masterClrMapping/>
-  </p:clrMapOvr>
-</p:notes>
-</file>
-
-<file path=ppt/notesSlides/notesSlide7.xml><?xml version="1.0" encoding="utf-8"?>
-<p:notes xmlns:a="http://schemas.openxmlformats.org/drawingml/2006/main" xmlns:r="http://schemas.openxmlformats.org/officeDocument/2006/relationships" xmlns:p="http://schemas.openxmlformats.org/presentationml/2006/main">
-  <p:cSld>
-    <p:spTree>
-      <p:nvGrpSpPr>
-        <p:cNvPr id="1" name=""/>
-        <p:cNvGrpSpPr/>
-        <p:nvPr/>
-      </p:nvGrpSpPr>
-      <p:grpSpPr>
-        <a:xfrm>
-          <a:off x="0" y="0"/>
-          <a:ext cx="0" cy="0"/>
-          <a:chOff x="0" y="0"/>
-          <a:chExt cx="0" cy="0"/>
-        </a:xfrm>
-      </p:grpSpPr>
-      <p:sp>
-        <p:nvSpPr>
-          <p:cNvPr id="2" name="Slide Image Placeholder 1"/>
-          <p:cNvSpPr>
-            <a:spLocks noGrp="1" noRot="1" noChangeAspect="1"/>
-          </p:cNvSpPr>
-          <p:nvPr>
-            <p:ph type="sldImg"/>
-          </p:nvPr>
-        </p:nvSpPr>
-        <p:spPr/>
-      </p:sp>
-      <p:sp>
-        <p:nvSpPr>
-          <p:cNvPr id="3" name="Notes Placeholder 2"/>
-          <p:cNvSpPr>
-            <a:spLocks noGrp="1"/>
-          </p:cNvSpPr>
-          <p:nvPr>
-            <p:ph type="body" idx="1"/>
-          </p:nvPr>
-        </p:nvSpPr>
-        <p:spPr/>
-        <p:txBody>
-          <a:bodyPr/>
-          <a:lstStyle/>
-          <a:p>
-            <a:endParaRPr lang="en-US" dirty="0"/>
-          </a:p>
-        </p:txBody>
-      </p:sp>
-      <p:sp>
-        <p:nvSpPr>
-          <p:cNvPr id="4" name="Slide Number Placeholder 3"/>
-          <p:cNvSpPr>
-            <a:spLocks noGrp="1"/>
-          </p:cNvSpPr>
-          <p:nvPr>
-            <p:ph type="sldNum" sz="quarter" idx="5"/>
-          </p:nvPr>
-        </p:nvSpPr>
-        <p:spPr/>
-        <p:txBody>
-          <a:bodyPr/>
-          <a:lstStyle/>
-          <a:p>
-            <a:fld id="{3148858F-F1DB-4027-9C85-CCA6849540DD}" type="slidenum">
-              <a:rPr lang="en-US" smtClean="0"/>
-              <a:t>7</a:t>
-            </a:fld>
-            <a:endParaRPr lang="en-US"/>
-          </a:p>
-        </p:txBody>
-      </p:sp>
-    </p:spTree>
-    <p:extLst>
-      <p:ext uri="{BB962C8B-B14F-4D97-AF65-F5344CB8AC3E}">
-        <p14:creationId xmlns:p14="http://schemas.microsoft.com/office/powerpoint/2010/main" val="530243603"/>
+        <p14:creationId xmlns:p14="http://schemas.microsoft.com/office/powerpoint/2010/main" val="1135150984"/>
       </p:ext>
     </p:extLst>
   </p:cSld>
@@ -1277,7 +1104,7 @@
           <a:p>
             <a:fld id="{C3F78080-8D0A-4BE8-A5B4-CB115102D524}" type="datetimeFigureOut">
               <a:rPr lang="en-US" smtClean="0"/>
-              <a:t>6/14/2022</a:t>
+              <a:t>9/1/2022</a:t>
             </a:fld>
             <a:endParaRPr lang="en-US"/>
           </a:p>
@@ -1475,7 +1302,7 @@
           <a:p>
             <a:fld id="{C3F78080-8D0A-4BE8-A5B4-CB115102D524}" type="datetimeFigureOut">
               <a:rPr lang="en-US" smtClean="0"/>
-              <a:t>6/14/2022</a:t>
+              <a:t>9/1/2022</a:t>
             </a:fld>
             <a:endParaRPr lang="en-US"/>
           </a:p>
@@ -1683,7 +1510,7 @@
           <a:p>
             <a:fld id="{C3F78080-8D0A-4BE8-A5B4-CB115102D524}" type="datetimeFigureOut">
               <a:rPr lang="en-US" smtClean="0"/>
-              <a:t>6/14/2022</a:t>
+              <a:t>9/1/2022</a:t>
             </a:fld>
             <a:endParaRPr lang="en-US"/>
           </a:p>
@@ -1881,7 +1708,7 @@
           <a:p>
             <a:fld id="{C3F78080-8D0A-4BE8-A5B4-CB115102D524}" type="datetimeFigureOut">
               <a:rPr lang="en-US" smtClean="0"/>
-              <a:t>6/14/2022</a:t>
+              <a:t>9/1/2022</a:t>
             </a:fld>
             <a:endParaRPr lang="en-US"/>
           </a:p>
@@ -2156,7 +1983,7 @@
           <a:p>
             <a:fld id="{C3F78080-8D0A-4BE8-A5B4-CB115102D524}" type="datetimeFigureOut">
               <a:rPr lang="en-US" smtClean="0"/>
-              <a:t>6/14/2022</a:t>
+              <a:t>9/1/2022</a:t>
             </a:fld>
             <a:endParaRPr lang="en-US"/>
           </a:p>
@@ -2421,7 +2248,7 @@
           <a:p>
             <a:fld id="{C3F78080-8D0A-4BE8-A5B4-CB115102D524}" type="datetimeFigureOut">
               <a:rPr lang="en-US" smtClean="0"/>
-              <a:t>6/14/2022</a:t>
+              <a:t>9/1/2022</a:t>
             </a:fld>
             <a:endParaRPr lang="en-US"/>
           </a:p>
@@ -2833,7 +2660,7 @@
           <a:p>
             <a:fld id="{C3F78080-8D0A-4BE8-A5B4-CB115102D524}" type="datetimeFigureOut">
               <a:rPr lang="en-US" smtClean="0"/>
-              <a:t>6/14/2022</a:t>
+              <a:t>9/1/2022</a:t>
             </a:fld>
             <a:endParaRPr lang="en-US"/>
           </a:p>
@@ -2974,7 +2801,7 @@
           <a:p>
             <a:fld id="{C3F78080-8D0A-4BE8-A5B4-CB115102D524}" type="datetimeFigureOut">
               <a:rPr lang="en-US" smtClean="0"/>
-              <a:t>6/14/2022</a:t>
+              <a:t>9/1/2022</a:t>
             </a:fld>
             <a:endParaRPr lang="en-US"/>
           </a:p>
@@ -3087,7 +2914,7 @@
           <a:p>
             <a:fld id="{C3F78080-8D0A-4BE8-A5B4-CB115102D524}" type="datetimeFigureOut">
               <a:rPr lang="en-US" smtClean="0"/>
-              <a:t>6/14/2022</a:t>
+              <a:t>9/1/2022</a:t>
             </a:fld>
             <a:endParaRPr lang="en-US"/>
           </a:p>
@@ -3398,7 +3225,7 @@
           <a:p>
             <a:fld id="{C3F78080-8D0A-4BE8-A5B4-CB115102D524}" type="datetimeFigureOut">
               <a:rPr lang="en-US" smtClean="0"/>
-              <a:t>6/14/2022</a:t>
+              <a:t>9/1/2022</a:t>
             </a:fld>
             <a:endParaRPr lang="en-US"/>
           </a:p>
@@ -3686,7 +3513,7 @@
           <a:p>
             <a:fld id="{C3F78080-8D0A-4BE8-A5B4-CB115102D524}" type="datetimeFigureOut">
               <a:rPr lang="en-US" smtClean="0"/>
-              <a:t>6/14/2022</a:t>
+              <a:t>9/1/2022</a:t>
             </a:fld>
             <a:endParaRPr lang="en-US"/>
           </a:p>
@@ -3927,7 +3754,7 @@
           <a:p>
             <a:fld id="{C3F78080-8D0A-4BE8-A5B4-CB115102D524}" type="datetimeFigureOut">
               <a:rPr lang="en-US" smtClean="0"/>
-              <a:t>6/14/2022</a:t>
+              <a:t>9/1/2022</a:t>
             </a:fld>
             <a:endParaRPr lang="en-US"/>
           </a:p>
@@ -5124,6 +4951,75 @@
 </file>
 
 <file path=ppt/slides/slide4.xml><?xml version="1.0" encoding="utf-8"?>
+<p:sld xmlns:a="http://schemas.openxmlformats.org/drawingml/2006/main" xmlns:r="http://schemas.openxmlformats.org/officeDocument/2006/relationships" xmlns:p="http://schemas.openxmlformats.org/presentationml/2006/main">
+  <p:cSld>
+    <p:spTree>
+      <p:nvGrpSpPr>
+        <p:cNvPr id="1" name=""/>
+        <p:cNvGrpSpPr/>
+        <p:nvPr/>
+      </p:nvGrpSpPr>
+      <p:grpSpPr>
+        <a:xfrm>
+          <a:off x="0" y="0"/>
+          <a:ext cx="0" cy="0"/>
+          <a:chOff x="0" y="0"/>
+          <a:chExt cx="0" cy="0"/>
+        </a:xfrm>
+      </p:grpSpPr>
+      <p:pic>
+        <p:nvPicPr>
+          <p:cNvPr id="3" name="Graphic 2">
+            <a:extLst>
+              <a:ext uri="{FF2B5EF4-FFF2-40B4-BE49-F238E27FC236}">
+                <a16:creationId xmlns:a16="http://schemas.microsoft.com/office/drawing/2014/main" id="{37B15A5D-91AF-41E0-809F-0D084640631F}"/>
+              </a:ext>
+            </a:extLst>
+          </p:cNvPr>
+          <p:cNvPicPr>
+            <a:picLocks noChangeAspect="1"/>
+          </p:cNvPicPr>
+          <p:nvPr/>
+        </p:nvPicPr>
+        <p:blipFill>
+          <a:blip r:embed="rId3">
+            <a:extLst>
+              <a:ext uri="{28A0092B-C50C-407E-A947-70E740481C1C}">
+                <a14:useLocalDpi xmlns:a14="http://schemas.microsoft.com/office/drawing/2010/main" val="0"/>
+              </a:ext>
+              <a:ext uri="{96DAC541-7B7A-43D3-8B79-37D633B846F1}">
+                <asvg:svgBlip xmlns:asvg="http://schemas.microsoft.com/office/drawing/2016/SVG/main" r:embed="rId4"/>
+              </a:ext>
+            </a:extLst>
+          </a:blip>
+          <a:stretch>
+            <a:fillRect/>
+          </a:stretch>
+        </p:blipFill>
+        <p:spPr>
+          <a:xfrm>
+            <a:off x="0" y="0"/>
+            <a:ext cx="12192000" cy="6858000"/>
+          </a:xfrm>
+          <a:prstGeom prst="rect">
+            <a:avLst/>
+          </a:prstGeom>
+        </p:spPr>
+      </p:pic>
+    </p:spTree>
+    <p:extLst>
+      <p:ext uri="{BB962C8B-B14F-4D97-AF65-F5344CB8AC3E}">
+        <p14:creationId xmlns:p14="http://schemas.microsoft.com/office/powerpoint/2010/main" val="1243390756"/>
+      </p:ext>
+    </p:extLst>
+  </p:cSld>
+  <p:clrMapOvr>
+    <a:masterClrMapping/>
+  </p:clrMapOvr>
+</p:sld>
+</file>
+
+<file path=ppt/slides/slide5.xml><?xml version="1.0" encoding="utf-8"?>
 <p:sld xmlns:a="http://schemas.openxmlformats.org/drawingml/2006/main" xmlns:r="http://schemas.openxmlformats.org/officeDocument/2006/relationships" xmlns:p="http://schemas.openxmlformats.org/presentationml/2006/main">
   <p:cSld>
     <p:spTree>
@@ -6529,177 +6425,6 @@
       <p:bldP spid="10" grpId="0"/>
     </p:bldLst>
   </p:timing>
-</p:sld>
-</file>
-
-<file path=ppt/slides/slide5.xml><?xml version="1.0" encoding="utf-8"?>
-<p:sld xmlns:a="http://schemas.openxmlformats.org/drawingml/2006/main" xmlns:r="http://schemas.openxmlformats.org/officeDocument/2006/relationships" xmlns:p="http://schemas.openxmlformats.org/presentationml/2006/main">
-  <p:cSld>
-    <p:spTree>
-      <p:nvGrpSpPr>
-        <p:cNvPr id="1" name=""/>
-        <p:cNvGrpSpPr/>
-        <p:nvPr/>
-      </p:nvGrpSpPr>
-      <p:grpSpPr>
-        <a:xfrm>
-          <a:off x="0" y="0"/>
-          <a:ext cx="0" cy="0"/>
-          <a:chOff x="0" y="0"/>
-          <a:chExt cx="0" cy="0"/>
-        </a:xfrm>
-      </p:grpSpPr>
-      <p:pic>
-        <p:nvPicPr>
-          <p:cNvPr id="3" name="Picture 2">
-            <a:extLst>
-              <a:ext uri="{FF2B5EF4-FFF2-40B4-BE49-F238E27FC236}">
-                <a16:creationId xmlns:a16="http://schemas.microsoft.com/office/drawing/2014/main" id="{D4F29E86-F4EC-4823-9A43-A52FE451A52D}"/>
-              </a:ext>
-            </a:extLst>
-          </p:cNvPr>
-          <p:cNvPicPr>
-            <a:picLocks noChangeAspect="1"/>
-          </p:cNvPicPr>
-          <p:nvPr/>
-        </p:nvPicPr>
-        <p:blipFill>
-          <a:blip r:embed="rId3"/>
-          <a:stretch>
-            <a:fillRect/>
-          </a:stretch>
-        </p:blipFill>
-        <p:spPr>
-          <a:xfrm>
-            <a:off x="3333037" y="960774"/>
-            <a:ext cx="5525925" cy="5245292"/>
-          </a:xfrm>
-          <a:prstGeom prst="rect">
-            <a:avLst/>
-          </a:prstGeom>
-        </p:spPr>
-      </p:pic>
-    </p:spTree>
-    <p:extLst>
-      <p:ext uri="{BB962C8B-B14F-4D97-AF65-F5344CB8AC3E}">
-        <p14:creationId xmlns:p14="http://schemas.microsoft.com/office/powerpoint/2010/main" val="2533188322"/>
-      </p:ext>
-    </p:extLst>
-  </p:cSld>
-  <p:clrMapOvr>
-    <a:masterClrMapping/>
-  </p:clrMapOvr>
-  <mc:AlternateContent xmlns:mc="http://schemas.openxmlformats.org/markup-compatibility/2006" xmlns:p14="http://schemas.microsoft.com/office/powerpoint/2010/main">
-    <mc:Choice Requires="p14">
-      <p:transition spd="med" p14:dur="700">
-        <p:fade/>
-      </p:transition>
-    </mc:Choice>
-    <mc:Fallback xmlns="">
-      <p:transition spd="med">
-        <p:fade/>
-      </p:transition>
-    </mc:Fallback>
-  </mc:AlternateContent>
-</p:sld>
-</file>
-
-<file path=ppt/slides/slide6.xml><?xml version="1.0" encoding="utf-8"?>
-<p:sld xmlns:a="http://schemas.openxmlformats.org/drawingml/2006/main" xmlns:r="http://schemas.openxmlformats.org/officeDocument/2006/relationships" xmlns:p="http://schemas.openxmlformats.org/presentationml/2006/main">
-  <p:cSld>
-    <p:spTree>
-      <p:nvGrpSpPr>
-        <p:cNvPr id="1" name=""/>
-        <p:cNvGrpSpPr/>
-        <p:nvPr/>
-      </p:nvGrpSpPr>
-      <p:grpSpPr>
-        <a:xfrm>
-          <a:off x="0" y="0"/>
-          <a:ext cx="0" cy="0"/>
-          <a:chOff x="0" y="0"/>
-          <a:chExt cx="0" cy="0"/>
-        </a:xfrm>
-      </p:grpSpPr>
-    </p:spTree>
-    <p:extLst>
-      <p:ext uri="{BB962C8B-B14F-4D97-AF65-F5344CB8AC3E}">
-        <p14:creationId xmlns:p14="http://schemas.microsoft.com/office/powerpoint/2010/main" val="4286535531"/>
-      </p:ext>
-    </p:extLst>
-  </p:cSld>
-  <p:clrMapOvr>
-    <a:masterClrMapping/>
-  </p:clrMapOvr>
-</p:sld>
-</file>
-
-<file path=ppt/slides/slide7.xml><?xml version="1.0" encoding="utf-8"?>
-<p:sld xmlns:a="http://schemas.openxmlformats.org/drawingml/2006/main" xmlns:r="http://schemas.openxmlformats.org/officeDocument/2006/relationships" xmlns:p="http://schemas.openxmlformats.org/presentationml/2006/main">
-  <p:cSld>
-    <p:spTree>
-      <p:nvGrpSpPr>
-        <p:cNvPr id="1" name=""/>
-        <p:cNvGrpSpPr/>
-        <p:nvPr/>
-      </p:nvGrpSpPr>
-      <p:grpSpPr>
-        <a:xfrm>
-          <a:off x="0" y="0"/>
-          <a:ext cx="0" cy="0"/>
-          <a:chOff x="0" y="0"/>
-          <a:chExt cx="0" cy="0"/>
-        </a:xfrm>
-      </p:grpSpPr>
-      <p:pic>
-        <p:nvPicPr>
-          <p:cNvPr id="3" name="Graphic 2">
-            <a:extLst>
-              <a:ext uri="{FF2B5EF4-FFF2-40B4-BE49-F238E27FC236}">
-                <a16:creationId xmlns:a16="http://schemas.microsoft.com/office/drawing/2014/main" id="{37B15A5D-91AF-41E0-809F-0D084640631F}"/>
-              </a:ext>
-            </a:extLst>
-          </p:cNvPr>
-          <p:cNvPicPr>
-            <a:picLocks noChangeAspect="1"/>
-          </p:cNvPicPr>
-          <p:nvPr/>
-        </p:nvPicPr>
-        <p:blipFill>
-          <a:blip r:embed="rId3">
-            <a:extLst>
-              <a:ext uri="{28A0092B-C50C-407E-A947-70E740481C1C}">
-                <a14:useLocalDpi xmlns:a14="http://schemas.microsoft.com/office/drawing/2010/main" val="0"/>
-              </a:ext>
-              <a:ext uri="{96DAC541-7B7A-43D3-8B79-37D633B846F1}">
-                <asvg:svgBlip xmlns:asvg="http://schemas.microsoft.com/office/drawing/2016/SVG/main" r:embed="rId4"/>
-              </a:ext>
-            </a:extLst>
-          </a:blip>
-          <a:stretch>
-            <a:fillRect/>
-          </a:stretch>
-        </p:blipFill>
-        <p:spPr>
-          <a:xfrm>
-            <a:off x="0" y="0"/>
-            <a:ext cx="12192000" cy="6858000"/>
-          </a:xfrm>
-          <a:prstGeom prst="rect">
-            <a:avLst/>
-          </a:prstGeom>
-        </p:spPr>
-      </p:pic>
-    </p:spTree>
-    <p:extLst>
-      <p:ext uri="{BB962C8B-B14F-4D97-AF65-F5344CB8AC3E}">
-        <p14:creationId xmlns:p14="http://schemas.microsoft.com/office/powerpoint/2010/main" val="1243390756"/>
-      </p:ext>
-    </p:extLst>
-  </p:cSld>
-  <p:clrMapOvr>
-    <a:masterClrMapping/>
-  </p:clrMapOvr>
 </p:sld>
 </file>
 

</xml_diff>